<commit_message>
final paper and presentatioon
</commit_message>
<xml_diff>
--- a/docs/assignments/final paper/James_Mortensen_Final_Presentation.pptx
+++ b/docs/assignments/final paper/James_Mortensen_Final_Presentation.pptx
@@ -12,8 +12,8 @@
     <p:sldId id="257" r:id="rId3"/>
     <p:sldId id="258" r:id="rId4"/>
     <p:sldId id="259" r:id="rId5"/>
-    <p:sldId id="260" r:id="rId6"/>
-    <p:sldId id="261" r:id="rId7"/>
+    <p:sldId id="261" r:id="rId6"/>
+    <p:sldId id="260" r:id="rId7"/>
     <p:sldId id="262" r:id="rId8"/>
     <p:sldId id="263" r:id="rId9"/>
     <p:sldId id="264" r:id="rId10"/>
@@ -116,6 +116,11 @@
       </a:defRPr>
     </a:lvl9pPr>
   </p:defaultTextStyle>
+  <p:extLst>
+    <p:ext uri="{EFAFB233-063F-42B5-8137-9DF3F51BA10A}">
+      <p15:sldGuideLst xmlns:p15="http://schemas.microsoft.com/office/powerpoint/2012/main"/>
+    </p:ext>
+  </p:extLst>
 </p:presentation>
 </file>
 
@@ -201,7 +206,7 @@
           <a:p>
             <a:fld id="{EFB0EDB9-2F8F-5545-AE43-9FFAFBF1A835}" type="datetimeFigureOut">
               <a:rPr lang="en-US" smtClean="0"/>
-              <a:t>6/11/23</a:t>
+              <a:t>6/12/23</a:t>
             </a:fld>
             <a:endParaRPr lang="en-US"/>
           </a:p>
@@ -512,6 +517,255 @@
           <a:bodyPr/>
           <a:lstStyle/>
           <a:p>
+            <a:r>
+              <a:rPr lang="en-US" dirty="0"/>
+              <a:t>Quick Overview</a:t>
+            </a:r>
+          </a:p>
+          <a:p>
+            <a:r>
+              <a:rPr lang="en-US" dirty="0"/>
+              <a:t>Previous Work – a couple papers that inspired this project</a:t>
+            </a:r>
+          </a:p>
+          <a:p>
+            <a:r>
+              <a:rPr lang="en-US" dirty="0"/>
+              <a:t>Experiment Design – My experiment and how it works</a:t>
+            </a:r>
+          </a:p>
+          <a:p>
+            <a:r>
+              <a:rPr lang="en-US" dirty="0"/>
+              <a:t>Results – Results of the experiment</a:t>
+            </a:r>
+          </a:p>
+          <a:p>
+            <a:r>
+              <a:rPr lang="en-US" dirty="0"/>
+              <a:t>Conclusion – conclusions from the experiment</a:t>
+            </a:r>
+          </a:p>
+          <a:p>
+            <a:r>
+              <a:rPr lang="en-US" dirty="0"/>
+              <a:t>Future Work – we will talk about more work that could be done</a:t>
+            </a:r>
+          </a:p>
+          <a:p>
+            <a:endParaRPr lang="en-US" dirty="0"/>
+          </a:p>
+        </p:txBody>
+      </p:sp>
+      <p:sp>
+        <p:nvSpPr>
+          <p:cNvPr id="4" name="Slide Number Placeholder 3"/>
+          <p:cNvSpPr>
+            <a:spLocks noGrp="1"/>
+          </p:cNvSpPr>
+          <p:nvPr>
+            <p:ph type="sldNum" sz="quarter" idx="5"/>
+          </p:nvPr>
+        </p:nvSpPr>
+        <p:spPr/>
+        <p:txBody>
+          <a:bodyPr/>
+          <a:lstStyle/>
+          <a:p>
+            <a:fld id="{7F319059-25A4-0F41-A286-2263025C0642}" type="slidenum">
+              <a:rPr lang="en-US" smtClean="0"/>
+              <a:t>2</a:t>
+            </a:fld>
+            <a:endParaRPr lang="en-US"/>
+          </a:p>
+        </p:txBody>
+      </p:sp>
+    </p:spTree>
+    <p:extLst>
+      <p:ext uri="{BB962C8B-B14F-4D97-AF65-F5344CB8AC3E}">
+        <p14:creationId xmlns:p14="http://schemas.microsoft.com/office/powerpoint/2010/main" val="3903237099"/>
+      </p:ext>
+    </p:extLst>
+  </p:cSld>
+  <p:clrMapOvr>
+    <a:masterClrMapping/>
+  </p:clrMapOvr>
+</p:notes>
+</file>
+
+<file path=ppt/notesSlides/notesSlide2.xml><?xml version="1.0" encoding="utf-8"?>
+<p:notes xmlns:a="http://schemas.openxmlformats.org/drawingml/2006/main" xmlns:r="http://schemas.openxmlformats.org/officeDocument/2006/relationships" xmlns:p="http://schemas.openxmlformats.org/presentationml/2006/main">
+  <p:cSld>
+    <p:spTree>
+      <p:nvGrpSpPr>
+        <p:cNvPr id="1" name=""/>
+        <p:cNvGrpSpPr/>
+        <p:nvPr/>
+      </p:nvGrpSpPr>
+      <p:grpSpPr>
+        <a:xfrm>
+          <a:off x="0" y="0"/>
+          <a:ext cx="0" cy="0"/>
+          <a:chOff x="0" y="0"/>
+          <a:chExt cx="0" cy="0"/>
+        </a:xfrm>
+      </p:grpSpPr>
+      <p:sp>
+        <p:nvSpPr>
+          <p:cNvPr id="2" name="Slide Image Placeholder 1"/>
+          <p:cNvSpPr>
+            <a:spLocks noGrp="1" noRot="1" noChangeAspect="1"/>
+          </p:cNvSpPr>
+          <p:nvPr>
+            <p:ph type="sldImg"/>
+          </p:nvPr>
+        </p:nvSpPr>
+        <p:spPr/>
+      </p:sp>
+      <p:sp>
+        <p:nvSpPr>
+          <p:cNvPr id="3" name="Notes Placeholder 2"/>
+          <p:cNvSpPr>
+            <a:spLocks noGrp="1"/>
+          </p:cNvSpPr>
+          <p:nvPr>
+            <p:ph type="body" idx="1"/>
+          </p:nvPr>
+        </p:nvSpPr>
+        <p:spPr/>
+        <p:txBody>
+          <a:bodyPr/>
+          <a:lstStyle/>
+          <a:p>
+            <a:r>
+              <a:rPr lang="en-US" dirty="0"/>
+              <a:t>There is a known correlation between a company’s earnings and the value of its stock.</a:t>
+            </a:r>
+          </a:p>
+          <a:p>
+            <a:endParaRPr lang="en-US" dirty="0"/>
+          </a:p>
+          <a:p>
+            <a:r>
+              <a:rPr lang="en-US" dirty="0"/>
+              <a:t>The graph to the right shows the S&amp;P 500’s total EPS overlayed onto the S&amp;P 500’s price</a:t>
+            </a:r>
+          </a:p>
+          <a:p>
+            <a:endParaRPr lang="en-US" dirty="0"/>
+          </a:p>
+          <a:p>
+            <a:r>
+              <a:rPr lang="en-US" dirty="0"/>
+              <a:t>The Correlation is obvious, not a perfect fit, but it is there.</a:t>
+            </a:r>
+          </a:p>
+          <a:p>
+            <a:endParaRPr lang="en-US" dirty="0"/>
+          </a:p>
+          <a:p>
+            <a:r>
+              <a:rPr lang="en-US" dirty="0"/>
+              <a:t>The question is: Can individual stock prices be predicted based on their historical earnings?</a:t>
+            </a:r>
+          </a:p>
+          <a:p>
+            <a:endParaRPr lang="en-US" dirty="0"/>
+          </a:p>
+          <a:p>
+            <a:r>
+              <a:rPr lang="en-US" dirty="0"/>
+              <a:t>The goal is to find value in the S&amp;P 500 index by predicting the 5 year return of individual stocks.</a:t>
+            </a:r>
+          </a:p>
+          <a:p>
+            <a:endParaRPr lang="en-US" dirty="0"/>
+          </a:p>
+          <a:p>
+            <a:endParaRPr lang="en-US" dirty="0"/>
+          </a:p>
+        </p:txBody>
+      </p:sp>
+      <p:sp>
+        <p:nvSpPr>
+          <p:cNvPr id="4" name="Slide Number Placeholder 3"/>
+          <p:cNvSpPr>
+            <a:spLocks noGrp="1"/>
+          </p:cNvSpPr>
+          <p:nvPr>
+            <p:ph type="sldNum" sz="quarter" idx="5"/>
+          </p:nvPr>
+        </p:nvSpPr>
+        <p:spPr/>
+        <p:txBody>
+          <a:bodyPr/>
+          <a:lstStyle/>
+          <a:p>
+            <a:fld id="{7F319059-25A4-0F41-A286-2263025C0642}" type="slidenum">
+              <a:rPr lang="en-US" smtClean="0"/>
+              <a:t>3</a:t>
+            </a:fld>
+            <a:endParaRPr lang="en-US"/>
+          </a:p>
+        </p:txBody>
+      </p:sp>
+    </p:spTree>
+    <p:extLst>
+      <p:ext uri="{BB962C8B-B14F-4D97-AF65-F5344CB8AC3E}">
+        <p14:creationId xmlns:p14="http://schemas.microsoft.com/office/powerpoint/2010/main" val="3268123038"/>
+      </p:ext>
+    </p:extLst>
+  </p:cSld>
+  <p:clrMapOvr>
+    <a:masterClrMapping/>
+  </p:clrMapOvr>
+</p:notes>
+</file>
+
+<file path=ppt/notesSlides/notesSlide3.xml><?xml version="1.0" encoding="utf-8"?>
+<p:notes xmlns:a="http://schemas.openxmlformats.org/drawingml/2006/main" xmlns:r="http://schemas.openxmlformats.org/officeDocument/2006/relationships" xmlns:p="http://schemas.openxmlformats.org/presentationml/2006/main">
+  <p:cSld>
+    <p:spTree>
+      <p:nvGrpSpPr>
+        <p:cNvPr id="1" name=""/>
+        <p:cNvGrpSpPr/>
+        <p:nvPr/>
+      </p:nvGrpSpPr>
+      <p:grpSpPr>
+        <a:xfrm>
+          <a:off x="0" y="0"/>
+          <a:ext cx="0" cy="0"/>
+          <a:chOff x="0" y="0"/>
+          <a:chExt cx="0" cy="0"/>
+        </a:xfrm>
+      </p:grpSpPr>
+      <p:sp>
+        <p:nvSpPr>
+          <p:cNvPr id="2" name="Slide Image Placeholder 1"/>
+          <p:cNvSpPr>
+            <a:spLocks noGrp="1" noRot="1" noChangeAspect="1"/>
+          </p:cNvSpPr>
+          <p:nvPr>
+            <p:ph type="sldImg"/>
+          </p:nvPr>
+        </p:nvSpPr>
+        <p:spPr/>
+      </p:sp>
+      <p:sp>
+        <p:nvSpPr>
+          <p:cNvPr id="3" name="Notes Placeholder 2"/>
+          <p:cNvSpPr>
+            <a:spLocks noGrp="1"/>
+          </p:cNvSpPr>
+          <p:nvPr>
+            <p:ph type="body" idx="1"/>
+          </p:nvPr>
+        </p:nvSpPr>
+        <p:spPr/>
+        <p:txBody>
+          <a:bodyPr/>
+          <a:lstStyle/>
+          <a:p>
             <a:pPr marL="0" marR="0" lvl="0" indent="0" algn="l" defTabSz="914400" rtl="0" eaLnBrk="1" fontAlgn="auto" latinLnBrk="0" hangingPunct="1">
               <a:lnSpc>
                 <a:spcPct val="100000"/>
@@ -536,50 +790,8 @@
                 <a:ea typeface="Calibri" panose="020F0502020204030204" pitchFamily="34" charset="0"/>
                 <a:cs typeface="Times New Roman" panose="02020603050405020304" pitchFamily="18" charset="0"/>
               </a:rPr>
-              <a:t>Y. Huang, S. Nakamori, and S.-Y. Wang, "Forecasting stock market movement direction with support vector machine," Computers &amp; Operations Research, vol. 32, no. 10, pp. 2513-2522, 2005.</a:t>
-            </a:r>
-            <a:r>
-              <a:rPr lang="en-US" dirty="0">
-                <a:effectLst/>
-              </a:rPr>
-              <a:t> </a:t>
-            </a:r>
-          </a:p>
-          <a:p>
-            <a:endParaRPr lang="en-US" dirty="0"/>
-          </a:p>
-          <a:p>
-            <a:pPr marL="171450" indent="-171450">
-              <a:buFont typeface="Arial" panose="020B0604020202020204" pitchFamily="34" charset="0"/>
-              <a:buChar char="•"/>
-            </a:pPr>
-            <a:r>
-              <a:rPr lang="en-US" dirty="0"/>
-              <a:t>Able to do this with individual stocks and indices HSI and KOSPI</a:t>
-            </a:r>
-          </a:p>
-          <a:p>
-            <a:pPr marL="171450" indent="-171450">
-              <a:buFont typeface="Arial" panose="020B0604020202020204" pitchFamily="34" charset="0"/>
-              <a:buChar char="•"/>
-            </a:pPr>
-            <a:r>
-              <a:rPr lang="en-US" dirty="0"/>
-              <a:t>Verified that international markets have co-movement and correlation to each other</a:t>
-            </a:r>
-          </a:p>
-          <a:p>
-            <a:pPr marL="171450" indent="-171450">
-              <a:buFont typeface="Arial" panose="020B0604020202020204" pitchFamily="34" charset="0"/>
-              <a:buChar char="•"/>
-            </a:pPr>
-            <a:endParaRPr lang="en-US" dirty="0"/>
-          </a:p>
-          <a:p>
-            <a:endParaRPr lang="en-US" dirty="0"/>
-          </a:p>
-          <a:p>
-            <a:endParaRPr lang="en-US" dirty="0"/>
+              <a:t>Y. Huang, S. Nakamori, and S.-Y. Wang, </a:t>
+            </a:r>
           </a:p>
           <a:p>
             <a:pPr marL="0" marR="0" lvl="0" indent="0" algn="l" defTabSz="914400" rtl="0" eaLnBrk="1" fontAlgn="auto" latinLnBrk="0" hangingPunct="1">
@@ -600,6 +812,70 @@
               <a:defRPr/>
             </a:pPr>
             <a:r>
+              <a:rPr lang="en-US" sz="1200" b="1" dirty="0"/>
+              <a:t>"Forecasting stock market movement direction with support vector machine," </a:t>
+            </a:r>
+            <a:endParaRPr lang="en-US" dirty="0"/>
+          </a:p>
+          <a:p>
+            <a:pPr marL="171450" indent="-171450">
+              <a:buFont typeface="Arial" panose="020B0604020202020204" pitchFamily="34" charset="0"/>
+              <a:buChar char="•"/>
+            </a:pPr>
+            <a:r>
+              <a:rPr lang="en-US" dirty="0"/>
+              <a:t>Able to do this prediction with individual stocks and indices HSI and KOSPI – Hong Kong and Korea, using a support vector machine</a:t>
+            </a:r>
+          </a:p>
+          <a:p>
+            <a:pPr marL="171450" indent="-171450">
+              <a:buFont typeface="Arial" panose="020B0604020202020204" pitchFamily="34" charset="0"/>
+              <a:buChar char="•"/>
+            </a:pPr>
+            <a:r>
+              <a:rPr lang="en-US" dirty="0"/>
+              <a:t>Utilized the S&amp;P 500 index, Exchange Rates, and some other macro economic indicators</a:t>
+            </a:r>
+          </a:p>
+          <a:p>
+            <a:pPr marL="171450" indent="-171450">
+              <a:buFont typeface="Arial" panose="020B0604020202020204" pitchFamily="34" charset="0"/>
+              <a:buChar char="•"/>
+            </a:pPr>
+            <a:r>
+              <a:rPr lang="en-US" dirty="0"/>
+              <a:t>Verified that international markets have co-movement and correlation to each other</a:t>
+            </a:r>
+          </a:p>
+          <a:p>
+            <a:pPr marL="171450" indent="-171450">
+              <a:buFont typeface="Arial" panose="020B0604020202020204" pitchFamily="34" charset="0"/>
+              <a:buChar char="•"/>
+            </a:pPr>
+            <a:endParaRPr lang="en-US" dirty="0"/>
+          </a:p>
+          <a:p>
+            <a:endParaRPr lang="en-US" dirty="0"/>
+          </a:p>
+          <a:p>
+            <a:pPr marL="0" marR="0" lvl="0" indent="0" algn="l" defTabSz="914400" rtl="0" eaLnBrk="1" fontAlgn="auto" latinLnBrk="0" hangingPunct="1">
+              <a:lnSpc>
+                <a:spcPct val="100000"/>
+              </a:lnSpc>
+              <a:spcBef>
+                <a:spcPts val="0"/>
+              </a:spcBef>
+              <a:spcAft>
+                <a:spcPts val="0"/>
+              </a:spcAft>
+              <a:buClrTx/>
+              <a:buSzTx/>
+              <a:buFontTx/>
+              <a:buNone/>
+              <a:tabLst/>
+              <a:defRPr/>
+            </a:pPr>
+            <a:r>
               <a:rPr lang="en-US" sz="1200" dirty="0">
                 <a:effectLst/>
                 <a:latin typeface="Calibri" panose="020F0502020204030204" pitchFamily="34" charset="0"/>
@@ -643,6 +919,19 @@
                 <a:effectLst/>
                 <a:latin typeface="Arial" panose="020B0604020202020204" pitchFamily="34" charset="0"/>
               </a:rPr>
+              <a:t>Exploration of how social media impacts market pressures</a:t>
+            </a:r>
+          </a:p>
+          <a:p>
+            <a:pPr marL="171450" indent="-171450">
+              <a:buFont typeface="Arial" panose="020B0604020202020204" pitchFamily="34" charset="0"/>
+              <a:buChar char="•"/>
+            </a:pPr>
+            <a:r>
+              <a:rPr lang="en-US" b="0" i="0" dirty="0">
+                <a:effectLst/>
+                <a:latin typeface="Arial" panose="020B0604020202020204" pitchFamily="34" charset="0"/>
+              </a:rPr>
               <a:t>High values of media pessimism induce downward pressure on market prices; and unusually</a:t>
             </a:r>
             <a:br>
@@ -689,19 +978,138 @@
                 <a:effectLst/>
                 <a:latin typeface="Arial" panose="020B0604020202020204" pitchFamily="34" charset="0"/>
               </a:rPr>
-              <a:t>it is possible to construct a hypothetical zero-cost trading strategy using Negative words</a:t>
-            </a:r>
-            <a:br>
-              <a:rPr lang="en-US" dirty="0"/>
-            </a:br>
+              <a:t>The study found that it is possible to construct a hypothetical zero-cost trading strategy using Negative words found on social media that yields returns as high as 7.3% per year</a:t>
+            </a:r>
+          </a:p>
+          <a:p>
+            <a:pPr marL="628650" lvl="1" indent="-171450">
+              <a:buFont typeface="Arial" panose="020B0604020202020204" pitchFamily="34" charset="0"/>
+              <a:buChar char="•"/>
+            </a:pPr>
             <a:r>
               <a:rPr lang="en-US" b="0" i="0" dirty="0">
                 <a:effectLst/>
                 <a:latin typeface="Arial" panose="020B0604020202020204" pitchFamily="34" charset="0"/>
               </a:rPr>
-              <a:t>that yields non-trivial excess returns–7.3% per year–with little risk – High Portfolio turnover – Commission</a:t>
-            </a:r>
-            <a:endParaRPr lang="en-US" dirty="0"/>
+              <a:t>With little risk – High Portfolio turnover – Commission Costs high</a:t>
+            </a:r>
+          </a:p>
+          <a:p>
+            <a:pPr marL="171450" indent="-171450">
+              <a:buFont typeface="Arial" panose="020B0604020202020204" pitchFamily="34" charset="0"/>
+              <a:buChar char="•"/>
+            </a:pPr>
+            <a:r>
+              <a:rPr lang="en-US" b="0" i="0" dirty="0">
+                <a:effectLst/>
+                <a:latin typeface="Arial" panose="020B0604020202020204" pitchFamily="34" charset="0"/>
+              </a:rPr>
+              <a:t>This research was some degree of evidence that this is not a straightforward problem</a:t>
+            </a:r>
+          </a:p>
+          <a:p>
+            <a:pPr marL="171450" indent="-171450">
+              <a:buFont typeface="Arial" panose="020B0604020202020204" pitchFamily="34" charset="0"/>
+              <a:buChar char="•"/>
+            </a:pPr>
+            <a:endParaRPr lang="en-US" b="0" i="0" dirty="0">
+              <a:effectLst/>
+              <a:latin typeface="Arial" panose="020B0604020202020204" pitchFamily="34" charset="0"/>
+            </a:endParaRPr>
+          </a:p>
+          <a:p>
+            <a:pPr marL="171450" indent="-171450">
+              <a:buFont typeface="Arial" panose="020B0604020202020204" pitchFamily="34" charset="0"/>
+              <a:buChar char="•"/>
+            </a:pPr>
+            <a:endParaRPr lang="en-US" b="0" i="0" dirty="0">
+              <a:effectLst/>
+              <a:latin typeface="Arial" panose="020B0604020202020204" pitchFamily="34" charset="0"/>
+            </a:endParaRPr>
+          </a:p>
+          <a:p>
+            <a:pPr marL="171450" indent="-171450">
+              <a:buFont typeface="Arial" panose="020B0604020202020204" pitchFamily="34" charset="0"/>
+              <a:buChar char="•"/>
+            </a:pPr>
+            <a:endParaRPr lang="en-US" b="0" i="0" dirty="0">
+              <a:effectLst/>
+              <a:latin typeface="Arial" panose="020B0604020202020204" pitchFamily="34" charset="0"/>
+            </a:endParaRPr>
+          </a:p>
+          <a:p>
+            <a:pPr marL="171450" marR="0" lvl="0" indent="-171450" algn="l" defTabSz="914400" rtl="0" eaLnBrk="1" fontAlgn="auto" latinLnBrk="0" hangingPunct="1">
+              <a:lnSpc>
+                <a:spcPct val="100000"/>
+              </a:lnSpc>
+              <a:spcBef>
+                <a:spcPts val="0"/>
+              </a:spcBef>
+              <a:spcAft>
+                <a:spcPts val="0"/>
+              </a:spcAft>
+              <a:buClrTx/>
+              <a:buSzTx/>
+              <a:buFont typeface="Arial" panose="020B0604020202020204" pitchFamily="34" charset="0"/>
+              <a:buChar char="•"/>
+              <a:tabLst/>
+              <a:defRPr/>
+            </a:pPr>
+            <a:r>
+              <a:rPr lang="en-US" sz="1800" dirty="0">
+                <a:effectLst/>
+                <a:latin typeface="Times New Roman" panose="02020603050405020304" pitchFamily="18" charset="0"/>
+                <a:ea typeface="MS Mincho" panose="02020609040205080304" pitchFamily="49" charset="-128"/>
+              </a:rPr>
+              <a:t>J. </a:t>
+            </a:r>
+            <a:r>
+              <a:rPr lang="en-US" sz="1800" dirty="0" err="1">
+                <a:effectLst/>
+                <a:latin typeface="Times New Roman" panose="02020603050405020304" pitchFamily="18" charset="0"/>
+                <a:ea typeface="MS Mincho" panose="02020609040205080304" pitchFamily="49" charset="-128"/>
+              </a:rPr>
+              <a:t>Ou</a:t>
+            </a:r>
+            <a:r>
+              <a:rPr lang="en-US" sz="1800" dirty="0">
+                <a:effectLst/>
+                <a:latin typeface="Times New Roman" panose="02020603050405020304" pitchFamily="18" charset="0"/>
+                <a:ea typeface="MS Mincho" panose="02020609040205080304" pitchFamily="49" charset="-128"/>
+              </a:rPr>
+              <a:t> and S. H. Penman, "Financial Statement Analysis and the Prediction of Stock Returns," Journal of Accounting and Economics</a:t>
+            </a:r>
+          </a:p>
+          <a:p>
+            <a:pPr marL="628650" marR="0" lvl="1" indent="-171450" algn="l" defTabSz="914400" rtl="0" eaLnBrk="1" fontAlgn="auto" latinLnBrk="0" hangingPunct="1">
+              <a:lnSpc>
+                <a:spcPct val="100000"/>
+              </a:lnSpc>
+              <a:spcBef>
+                <a:spcPts val="0"/>
+              </a:spcBef>
+              <a:spcAft>
+                <a:spcPts val="0"/>
+              </a:spcAft>
+              <a:buClrTx/>
+              <a:buSzTx/>
+              <a:buFont typeface="Arial" panose="020B0604020202020204" pitchFamily="34" charset="0"/>
+              <a:buChar char="•"/>
+              <a:tabLst/>
+              <a:defRPr/>
+            </a:pPr>
+            <a:r>
+              <a:rPr lang="en-US" b="0" i="0" dirty="0">
+                <a:effectLst/>
+                <a:latin typeface="Times New Roman" panose="02020603050405020304" pitchFamily="18" charset="0"/>
+                <a:ea typeface="MS Mincho" panose="02020609040205080304" pitchFamily="49" charset="-128"/>
+              </a:rPr>
+              <a:t>Discussion about how changes in </a:t>
+            </a:r>
+            <a:endParaRPr lang="en-US" b="0" i="0" dirty="0">
+              <a:effectLst/>
+              <a:latin typeface="Arial" panose="020B0604020202020204" pitchFamily="34" charset="0"/>
+            </a:endParaRPr>
           </a:p>
         </p:txBody>
       </p:sp>
@@ -741,7 +1149,868 @@
 </p:notes>
 </file>
 
-<file path=ppt/notesSlides/notesSlide2.xml><?xml version="1.0" encoding="utf-8"?>
+<file path=ppt/notesSlides/notesSlide4.xml><?xml version="1.0" encoding="utf-8"?>
+<p:notes xmlns:a="http://schemas.openxmlformats.org/drawingml/2006/main" xmlns:r="http://schemas.openxmlformats.org/officeDocument/2006/relationships" xmlns:p="http://schemas.openxmlformats.org/presentationml/2006/main">
+  <p:cSld>
+    <p:spTree>
+      <p:nvGrpSpPr>
+        <p:cNvPr id="1" name=""/>
+        <p:cNvGrpSpPr/>
+        <p:nvPr/>
+      </p:nvGrpSpPr>
+      <p:grpSpPr>
+        <a:xfrm>
+          <a:off x="0" y="0"/>
+          <a:ext cx="0" cy="0"/>
+          <a:chOff x="0" y="0"/>
+          <a:chExt cx="0" cy="0"/>
+        </a:xfrm>
+      </p:grpSpPr>
+      <p:sp>
+        <p:nvSpPr>
+          <p:cNvPr id="2" name="Slide Image Placeholder 1"/>
+          <p:cNvSpPr>
+            <a:spLocks noGrp="1" noRot="1" noChangeAspect="1"/>
+          </p:cNvSpPr>
+          <p:nvPr>
+            <p:ph type="sldImg"/>
+          </p:nvPr>
+        </p:nvSpPr>
+        <p:spPr/>
+      </p:sp>
+      <p:sp>
+        <p:nvSpPr>
+          <p:cNvPr id="3" name="Notes Placeholder 2"/>
+          <p:cNvSpPr>
+            <a:spLocks noGrp="1"/>
+          </p:cNvSpPr>
+          <p:nvPr>
+            <p:ph type="body" idx="1"/>
+          </p:nvPr>
+        </p:nvSpPr>
+        <p:spPr/>
+        <p:txBody>
+          <a:bodyPr/>
+          <a:lstStyle/>
+          <a:p>
+            <a:pPr marL="171450" indent="-171450">
+              <a:buFont typeface="Arial" panose="020B0604020202020204" pitchFamily="34" charset="0"/>
+              <a:buChar char="•"/>
+            </a:pPr>
+            <a:r>
+              <a:rPr lang="en-US" dirty="0"/>
+              <a:t>JSON files are collected from Alpha Vantage API – I put a red box around the functions I used from the API</a:t>
+            </a:r>
+          </a:p>
+          <a:p>
+            <a:pPr marL="171450" indent="-171450">
+              <a:buFont typeface="Arial" panose="020B0604020202020204" pitchFamily="34" charset="0"/>
+              <a:buChar char="•"/>
+            </a:pPr>
+            <a:r>
+              <a:rPr lang="en-US" dirty="0"/>
+              <a:t>Dozens of parameters contained in those files – </a:t>
+            </a:r>
+          </a:p>
+          <a:p>
+            <a:pPr marL="628650" lvl="1" indent="-171450">
+              <a:buFont typeface="Arial" panose="020B0604020202020204" pitchFamily="34" charset="0"/>
+              <a:buChar char="•"/>
+            </a:pPr>
+            <a:r>
+              <a:rPr lang="en-US" dirty="0"/>
+              <a:t>Choose relevant parameters and contain them into some kind of time series</a:t>
+            </a:r>
+          </a:p>
+          <a:p>
+            <a:pPr marL="171450" indent="-171450">
+              <a:buFont typeface="Arial" panose="020B0604020202020204" pitchFamily="34" charset="0"/>
+              <a:buChar char="•"/>
+            </a:pPr>
+            <a:r>
+              <a:rPr lang="en-US" dirty="0"/>
+              <a:t>CSV output contains: Ticker, Fiscal Year, Cash Flow, Book Value, Earnings, and 5 Year Return</a:t>
+            </a:r>
+          </a:p>
+        </p:txBody>
+      </p:sp>
+      <p:sp>
+        <p:nvSpPr>
+          <p:cNvPr id="4" name="Slide Number Placeholder 3"/>
+          <p:cNvSpPr>
+            <a:spLocks noGrp="1"/>
+          </p:cNvSpPr>
+          <p:nvPr>
+            <p:ph type="sldNum" sz="quarter" idx="5"/>
+          </p:nvPr>
+        </p:nvSpPr>
+        <p:spPr/>
+        <p:txBody>
+          <a:bodyPr/>
+          <a:lstStyle/>
+          <a:p>
+            <a:fld id="{7F319059-25A4-0F41-A286-2263025C0642}" type="slidenum">
+              <a:rPr lang="en-US" smtClean="0"/>
+              <a:t>5</a:t>
+            </a:fld>
+            <a:endParaRPr lang="en-US"/>
+          </a:p>
+        </p:txBody>
+      </p:sp>
+    </p:spTree>
+    <p:extLst>
+      <p:ext uri="{BB962C8B-B14F-4D97-AF65-F5344CB8AC3E}">
+        <p14:creationId xmlns:p14="http://schemas.microsoft.com/office/powerpoint/2010/main" val="2739717649"/>
+      </p:ext>
+    </p:extLst>
+  </p:cSld>
+  <p:clrMapOvr>
+    <a:masterClrMapping/>
+  </p:clrMapOvr>
+</p:notes>
+</file>
+
+<file path=ppt/notesSlides/notesSlide5.xml><?xml version="1.0" encoding="utf-8"?>
+<p:notes xmlns:a="http://schemas.openxmlformats.org/drawingml/2006/main" xmlns:r="http://schemas.openxmlformats.org/officeDocument/2006/relationships" xmlns:p="http://schemas.openxmlformats.org/presentationml/2006/main">
+  <p:cSld>
+    <p:spTree>
+      <p:nvGrpSpPr>
+        <p:cNvPr id="1" name=""/>
+        <p:cNvGrpSpPr/>
+        <p:nvPr/>
+      </p:nvGrpSpPr>
+      <p:grpSpPr>
+        <a:xfrm>
+          <a:off x="0" y="0"/>
+          <a:ext cx="0" cy="0"/>
+          <a:chOff x="0" y="0"/>
+          <a:chExt cx="0" cy="0"/>
+        </a:xfrm>
+      </p:grpSpPr>
+      <p:sp>
+        <p:nvSpPr>
+          <p:cNvPr id="2" name="Slide Image Placeholder 1"/>
+          <p:cNvSpPr>
+            <a:spLocks noGrp="1" noRot="1" noChangeAspect="1"/>
+          </p:cNvSpPr>
+          <p:nvPr>
+            <p:ph type="sldImg"/>
+          </p:nvPr>
+        </p:nvSpPr>
+        <p:spPr/>
+      </p:sp>
+      <p:sp>
+        <p:nvSpPr>
+          <p:cNvPr id="3" name="Notes Placeholder 2"/>
+          <p:cNvSpPr>
+            <a:spLocks noGrp="1"/>
+          </p:cNvSpPr>
+          <p:nvPr>
+            <p:ph type="body" idx="1"/>
+          </p:nvPr>
+        </p:nvSpPr>
+        <p:spPr/>
+        <p:txBody>
+          <a:bodyPr/>
+          <a:lstStyle/>
+          <a:p>
+            <a:r>
+              <a:rPr lang="en-US" dirty="0"/>
+              <a:t>Data intake</a:t>
+            </a:r>
+          </a:p>
+          <a:p>
+            <a:r>
+              <a:rPr lang="en-US" dirty="0"/>
+              <a:t>	- Collected data </a:t>
+            </a:r>
+            <a:r>
+              <a:rPr lang="en-US" dirty="0">
+                <a:sym typeface="Wingdings" pitchFamily="2" charset="2"/>
+              </a:rPr>
+              <a:t> input CSV, data is loaded in.</a:t>
+            </a:r>
+          </a:p>
+          <a:p>
+            <a:r>
+              <a:rPr lang="en-US" dirty="0">
+                <a:sym typeface="Wingdings" pitchFamily="2" charset="2"/>
+              </a:rPr>
+              <a:t>	- Feature engineering – enrich data with YOY growth rates for each parameter</a:t>
+            </a:r>
+          </a:p>
+          <a:p>
+            <a:r>
+              <a:rPr lang="en-US" dirty="0">
+                <a:sym typeface="Wingdings" pitchFamily="2" charset="2"/>
+              </a:rPr>
+              <a:t>	- Initialize Models – Instantiate  all of the Scikit learn models  -- Linear Regression, Random Forest, and Support Vector Machine</a:t>
+            </a:r>
+          </a:p>
+          <a:p>
+            <a:pPr marL="0" marR="0" lvl="0" indent="0" algn="l" defTabSz="914400" rtl="0" eaLnBrk="1" fontAlgn="auto" latinLnBrk="0" hangingPunct="1">
+              <a:lnSpc>
+                <a:spcPct val="100000"/>
+              </a:lnSpc>
+              <a:spcBef>
+                <a:spcPts val="0"/>
+              </a:spcBef>
+              <a:spcAft>
+                <a:spcPts val="0"/>
+              </a:spcAft>
+              <a:buClrTx/>
+              <a:buSzTx/>
+              <a:buFontTx/>
+              <a:buNone/>
+              <a:tabLst/>
+              <a:defRPr/>
+            </a:pPr>
+            <a:r>
+              <a:rPr lang="en-US" dirty="0">
+                <a:sym typeface="Wingdings" pitchFamily="2" charset="2"/>
+              </a:rPr>
+              <a:t>	- I feed the data through a common preprocessor which does more feature engineering with the addition of an </a:t>
+            </a:r>
+            <a:r>
+              <a:rPr lang="en-US" b="0" dirty="0" err="1">
+                <a:solidFill>
+                  <a:srgbClr val="CE9178"/>
+                </a:solidFill>
+                <a:effectLst/>
+                <a:latin typeface="Menlo" panose="020B0609030804020204" pitchFamily="49" charset="0"/>
+              </a:rPr>
+              <a:t>Earnings_to_Book_Value</a:t>
+            </a:r>
+            <a:r>
+              <a:rPr lang="en-US" b="0" dirty="0">
+                <a:solidFill>
+                  <a:srgbClr val="CE9178"/>
+                </a:solidFill>
+                <a:effectLst/>
+                <a:latin typeface="Menlo" panose="020B0609030804020204" pitchFamily="49" charset="0"/>
+              </a:rPr>
+              <a:t> parameter</a:t>
+            </a:r>
+          </a:p>
+          <a:p>
+            <a:pPr marL="0" marR="0" lvl="0" indent="0" algn="l" defTabSz="914400" rtl="0" eaLnBrk="1" fontAlgn="auto" latinLnBrk="0" hangingPunct="1">
+              <a:lnSpc>
+                <a:spcPct val="100000"/>
+              </a:lnSpc>
+              <a:spcBef>
+                <a:spcPts val="0"/>
+              </a:spcBef>
+              <a:spcAft>
+                <a:spcPts val="0"/>
+              </a:spcAft>
+              <a:buClrTx/>
+              <a:buSzTx/>
+              <a:buFontTx/>
+              <a:buNone/>
+              <a:tabLst/>
+              <a:defRPr/>
+            </a:pPr>
+            <a:r>
+              <a:rPr lang="en-US" b="0" dirty="0">
+                <a:solidFill>
+                  <a:srgbClr val="CE9178"/>
+                </a:solidFill>
+                <a:effectLst/>
+                <a:latin typeface="Menlo" panose="020B0609030804020204" pitchFamily="49" charset="0"/>
+              </a:rPr>
+              <a:t>	- Each model then has the option to implement its own preprocessor, however I think I have left this blank in all cases, but after these two steps you have your split training and testing data.</a:t>
+            </a:r>
+          </a:p>
+          <a:p>
+            <a:pPr marL="0" marR="0" lvl="0" indent="0" algn="l" defTabSz="914400" rtl="0" eaLnBrk="1" fontAlgn="auto" latinLnBrk="0" hangingPunct="1">
+              <a:lnSpc>
+                <a:spcPct val="100000"/>
+              </a:lnSpc>
+              <a:spcBef>
+                <a:spcPts val="0"/>
+              </a:spcBef>
+              <a:spcAft>
+                <a:spcPts val="0"/>
+              </a:spcAft>
+              <a:buClrTx/>
+              <a:buSzTx/>
+              <a:buFontTx/>
+              <a:buNone/>
+              <a:tabLst/>
+              <a:defRPr/>
+            </a:pPr>
+            <a:r>
+              <a:rPr lang="en-US" b="0" dirty="0">
+                <a:solidFill>
+                  <a:srgbClr val="CE9178"/>
+                </a:solidFill>
+                <a:effectLst/>
+                <a:latin typeface="Menlo" panose="020B0609030804020204" pitchFamily="49" charset="0"/>
+              </a:rPr>
+              <a:t>	- Outliers are removed from the training data, but not the testing data.</a:t>
+            </a:r>
+          </a:p>
+          <a:p>
+            <a:pPr marL="0" marR="0" lvl="0" indent="0" algn="l" defTabSz="914400" rtl="0" eaLnBrk="1" fontAlgn="auto" latinLnBrk="0" hangingPunct="1">
+              <a:lnSpc>
+                <a:spcPct val="100000"/>
+              </a:lnSpc>
+              <a:spcBef>
+                <a:spcPts val="0"/>
+              </a:spcBef>
+              <a:spcAft>
+                <a:spcPts val="0"/>
+              </a:spcAft>
+              <a:buClrTx/>
+              <a:buSzTx/>
+              <a:buFontTx/>
+              <a:buNone/>
+              <a:tabLst/>
+              <a:defRPr/>
+            </a:pPr>
+            <a:r>
+              <a:rPr lang="en-US" b="0" dirty="0">
+                <a:solidFill>
+                  <a:srgbClr val="CE9178"/>
+                </a:solidFill>
+                <a:effectLst/>
+                <a:latin typeface="Menlo" panose="020B0609030804020204" pitchFamily="49" charset="0"/>
+              </a:rPr>
+              <a:t>	- I then fit a </a:t>
+            </a:r>
+            <a:r>
+              <a:rPr lang="en-US" b="0" dirty="0" err="1">
+                <a:solidFill>
+                  <a:srgbClr val="CE9178"/>
+                </a:solidFill>
+                <a:effectLst/>
+                <a:latin typeface="Menlo" panose="020B0609030804020204" pitchFamily="49" charset="0"/>
+              </a:rPr>
+              <a:t>StandardScalar</a:t>
+            </a:r>
+            <a:r>
+              <a:rPr lang="en-US" b="0" dirty="0">
+                <a:solidFill>
+                  <a:srgbClr val="CE9178"/>
+                </a:solidFill>
+                <a:effectLst/>
+                <a:latin typeface="Menlo" panose="020B0609030804020204" pitchFamily="49" charset="0"/>
+              </a:rPr>
+              <a:t> to the half of the training data</a:t>
+            </a:r>
+          </a:p>
+          <a:p>
+            <a:pPr marL="0" marR="0" lvl="0" indent="0" algn="l" defTabSz="914400" rtl="0" eaLnBrk="1" fontAlgn="auto" latinLnBrk="0" hangingPunct="1">
+              <a:lnSpc>
+                <a:spcPct val="100000"/>
+              </a:lnSpc>
+              <a:spcBef>
+                <a:spcPts val="0"/>
+              </a:spcBef>
+              <a:spcAft>
+                <a:spcPts val="0"/>
+              </a:spcAft>
+              <a:buClrTx/>
+              <a:buSzTx/>
+              <a:buFontTx/>
+              <a:buNone/>
+              <a:tabLst/>
+              <a:defRPr/>
+            </a:pPr>
+            <a:r>
+              <a:rPr lang="en-US" b="0" dirty="0">
+                <a:solidFill>
+                  <a:srgbClr val="CE9178"/>
+                </a:solidFill>
+                <a:effectLst/>
+                <a:latin typeface="Menlo" panose="020B0609030804020204" pitchFamily="49" charset="0"/>
+              </a:rPr>
+              <a:t>	- Feature selection is a bit complex and it behaves differently for each of the three models tested – </a:t>
+            </a:r>
+          </a:p>
+          <a:p>
+            <a:pPr marL="0" marR="0" lvl="0" indent="0" algn="l" defTabSz="914400" rtl="0" eaLnBrk="1" fontAlgn="auto" latinLnBrk="0" hangingPunct="1">
+              <a:lnSpc>
+                <a:spcPct val="100000"/>
+              </a:lnSpc>
+              <a:spcBef>
+                <a:spcPts val="0"/>
+              </a:spcBef>
+              <a:spcAft>
+                <a:spcPts val="0"/>
+              </a:spcAft>
+              <a:buClrTx/>
+              <a:buSzTx/>
+              <a:buFontTx/>
+              <a:buNone/>
+              <a:tabLst/>
+              <a:defRPr/>
+            </a:pPr>
+            <a:r>
+              <a:rPr lang="en-US" b="0" dirty="0">
+                <a:solidFill>
+                  <a:srgbClr val="CE9178"/>
+                </a:solidFill>
+                <a:effectLst/>
+                <a:latin typeface="Menlo" panose="020B0609030804020204" pitchFamily="49" charset="0"/>
+              </a:rPr>
+              <a:t>		- for support vector </a:t>
+            </a:r>
+            <a:r>
+              <a:rPr lang="en-US" b="0" dirty="0" err="1">
+                <a:solidFill>
+                  <a:srgbClr val="CE9178"/>
+                </a:solidFill>
+                <a:effectLst/>
+                <a:latin typeface="Menlo" panose="020B0609030804020204" pitchFamily="49" charset="0"/>
+              </a:rPr>
+              <a:t>machine,I</a:t>
+            </a:r>
+            <a:r>
+              <a:rPr lang="en-US" b="0" dirty="0">
+                <a:solidFill>
+                  <a:srgbClr val="CE9178"/>
+                </a:solidFill>
+                <a:effectLst/>
+                <a:latin typeface="Menlo" panose="020B0609030804020204" pitchFamily="49" charset="0"/>
+              </a:rPr>
+              <a:t> used </a:t>
+            </a:r>
+            <a:r>
+              <a:rPr lang="en-US" b="0" dirty="0" err="1">
+                <a:solidFill>
+                  <a:srgbClr val="CE9178"/>
+                </a:solidFill>
+                <a:effectLst/>
+                <a:latin typeface="Menlo" panose="020B0609030804020204" pitchFamily="49" charset="0"/>
+              </a:rPr>
+              <a:t>SelectKBest</a:t>
+            </a:r>
+            <a:r>
+              <a:rPr lang="en-US" b="0" dirty="0">
+                <a:solidFill>
+                  <a:srgbClr val="CE9178"/>
+                </a:solidFill>
+                <a:effectLst/>
+                <a:latin typeface="Menlo" panose="020B0609030804020204" pitchFamily="49" charset="0"/>
+              </a:rPr>
+              <a:t>, </a:t>
+            </a:r>
+          </a:p>
+          <a:p>
+            <a:pPr marL="0" marR="0" lvl="0" indent="0" algn="l" defTabSz="914400" rtl="0" eaLnBrk="1" fontAlgn="auto" latinLnBrk="0" hangingPunct="1">
+              <a:lnSpc>
+                <a:spcPct val="100000"/>
+              </a:lnSpc>
+              <a:spcBef>
+                <a:spcPts val="0"/>
+              </a:spcBef>
+              <a:spcAft>
+                <a:spcPts val="0"/>
+              </a:spcAft>
+              <a:buClrTx/>
+              <a:buSzTx/>
+              <a:buFontTx/>
+              <a:buNone/>
+              <a:tabLst/>
+              <a:defRPr/>
+            </a:pPr>
+            <a:r>
+              <a:rPr lang="en-US" b="0" dirty="0">
+                <a:solidFill>
+                  <a:srgbClr val="CE9178"/>
+                </a:solidFill>
+                <a:effectLst/>
+                <a:latin typeface="Menlo" panose="020B0609030804020204" pitchFamily="49" charset="0"/>
+              </a:rPr>
+              <a:t>		- All others were RFE feature elimination</a:t>
+            </a:r>
+          </a:p>
+          <a:p>
+            <a:pPr marL="0" marR="0" lvl="0" indent="0" algn="l" defTabSz="914400" rtl="0" eaLnBrk="1" fontAlgn="auto" latinLnBrk="0" hangingPunct="1">
+              <a:lnSpc>
+                <a:spcPct val="100000"/>
+              </a:lnSpc>
+              <a:spcBef>
+                <a:spcPts val="0"/>
+              </a:spcBef>
+              <a:spcAft>
+                <a:spcPts val="0"/>
+              </a:spcAft>
+              <a:buClrTx/>
+              <a:buSzTx/>
+              <a:buFontTx/>
+              <a:buNone/>
+              <a:tabLst/>
+              <a:defRPr/>
+            </a:pPr>
+            <a:r>
+              <a:rPr lang="en-US" b="0" dirty="0">
+                <a:solidFill>
+                  <a:srgbClr val="CE9178"/>
+                </a:solidFill>
+                <a:effectLst/>
+                <a:latin typeface="Menlo" panose="020B0609030804020204" pitchFamily="49" charset="0"/>
+              </a:rPr>
+              <a:t>	- These feature selections are then applied</a:t>
+            </a:r>
+          </a:p>
+          <a:p>
+            <a:pPr marL="0" marR="0" lvl="0" indent="0" algn="l" defTabSz="914400" rtl="0" eaLnBrk="1" fontAlgn="auto" latinLnBrk="0" hangingPunct="1">
+              <a:lnSpc>
+                <a:spcPct val="100000"/>
+              </a:lnSpc>
+              <a:spcBef>
+                <a:spcPts val="0"/>
+              </a:spcBef>
+              <a:spcAft>
+                <a:spcPts val="0"/>
+              </a:spcAft>
+              <a:buClrTx/>
+              <a:buSzTx/>
+              <a:buFontTx/>
+              <a:buNone/>
+              <a:tabLst/>
+              <a:defRPr/>
+            </a:pPr>
+            <a:r>
+              <a:rPr lang="en-US" b="0" dirty="0">
+                <a:solidFill>
+                  <a:srgbClr val="CE9178"/>
+                </a:solidFill>
+                <a:effectLst/>
+                <a:latin typeface="Menlo" panose="020B0609030804020204" pitchFamily="49" charset="0"/>
+              </a:rPr>
+              <a:t>	- The model is trained</a:t>
+            </a:r>
+          </a:p>
+          <a:p>
+            <a:pPr marL="0" marR="0" lvl="0" indent="0" algn="l" defTabSz="914400" rtl="0" eaLnBrk="1" fontAlgn="auto" latinLnBrk="0" hangingPunct="1">
+              <a:lnSpc>
+                <a:spcPct val="100000"/>
+              </a:lnSpc>
+              <a:spcBef>
+                <a:spcPts val="0"/>
+              </a:spcBef>
+              <a:spcAft>
+                <a:spcPts val="0"/>
+              </a:spcAft>
+              <a:buClrTx/>
+              <a:buSzTx/>
+              <a:buFontTx/>
+              <a:buNone/>
+              <a:tabLst/>
+              <a:defRPr/>
+            </a:pPr>
+            <a:r>
+              <a:rPr lang="en-US" b="0" dirty="0">
+                <a:solidFill>
+                  <a:srgbClr val="CE9178"/>
+                </a:solidFill>
+                <a:effectLst/>
+                <a:latin typeface="Menlo" panose="020B0609030804020204" pitchFamily="49" charset="0"/>
+              </a:rPr>
+              <a:t>	- Prediction is run</a:t>
+            </a:r>
+          </a:p>
+          <a:p>
+            <a:pPr marL="0" marR="0" lvl="0" indent="0" algn="l" defTabSz="914400" rtl="0" eaLnBrk="1" fontAlgn="auto" latinLnBrk="0" hangingPunct="1">
+              <a:lnSpc>
+                <a:spcPct val="100000"/>
+              </a:lnSpc>
+              <a:spcBef>
+                <a:spcPts val="0"/>
+              </a:spcBef>
+              <a:spcAft>
+                <a:spcPts val="0"/>
+              </a:spcAft>
+              <a:buClrTx/>
+              <a:buSzTx/>
+              <a:buFontTx/>
+              <a:buNone/>
+              <a:tabLst/>
+              <a:defRPr/>
+            </a:pPr>
+            <a:r>
+              <a:rPr lang="en-US" b="0" dirty="0">
+                <a:solidFill>
+                  <a:srgbClr val="CE9178"/>
+                </a:solidFill>
+                <a:effectLst/>
+                <a:latin typeface="Menlo" panose="020B0609030804020204" pitchFamily="49" charset="0"/>
+              </a:rPr>
+              <a:t>	- The model is then evaluated and cross validated</a:t>
+            </a:r>
+          </a:p>
+          <a:p>
+            <a:pPr marL="0" marR="0" lvl="0" indent="0" algn="l" defTabSz="914400" rtl="0" eaLnBrk="1" fontAlgn="auto" latinLnBrk="0" hangingPunct="1">
+              <a:lnSpc>
+                <a:spcPct val="100000"/>
+              </a:lnSpc>
+              <a:spcBef>
+                <a:spcPts val="0"/>
+              </a:spcBef>
+              <a:spcAft>
+                <a:spcPts val="0"/>
+              </a:spcAft>
+              <a:buClrTx/>
+              <a:buSzTx/>
+              <a:buFontTx/>
+              <a:buNone/>
+              <a:tabLst/>
+              <a:defRPr/>
+            </a:pPr>
+            <a:r>
+              <a:rPr lang="en-US" b="0" dirty="0">
+                <a:solidFill>
+                  <a:srgbClr val="CE9178"/>
+                </a:solidFill>
+                <a:effectLst/>
+                <a:latin typeface="Menlo" panose="020B0609030804020204" pitchFamily="49" charset="0"/>
+              </a:rPr>
+              <a:t>	- The results are then written to files, one containing the statistical metrics, and the other containing details about times required for training and predicting.</a:t>
+            </a:r>
+          </a:p>
+        </p:txBody>
+      </p:sp>
+      <p:sp>
+        <p:nvSpPr>
+          <p:cNvPr id="4" name="Slide Number Placeholder 3"/>
+          <p:cNvSpPr>
+            <a:spLocks noGrp="1"/>
+          </p:cNvSpPr>
+          <p:nvPr>
+            <p:ph type="sldNum" sz="quarter" idx="5"/>
+          </p:nvPr>
+        </p:nvSpPr>
+        <p:spPr/>
+        <p:txBody>
+          <a:bodyPr/>
+          <a:lstStyle/>
+          <a:p>
+            <a:fld id="{7F319059-25A4-0F41-A286-2263025C0642}" type="slidenum">
+              <a:rPr lang="en-US" smtClean="0"/>
+              <a:t>6</a:t>
+            </a:fld>
+            <a:endParaRPr lang="en-US"/>
+          </a:p>
+        </p:txBody>
+      </p:sp>
+    </p:spTree>
+    <p:extLst>
+      <p:ext uri="{BB962C8B-B14F-4D97-AF65-F5344CB8AC3E}">
+        <p14:creationId xmlns:p14="http://schemas.microsoft.com/office/powerpoint/2010/main" val="674728817"/>
+      </p:ext>
+    </p:extLst>
+  </p:cSld>
+  <p:clrMapOvr>
+    <a:masterClrMapping/>
+  </p:clrMapOvr>
+</p:notes>
+</file>
+
+<file path=ppt/notesSlides/notesSlide6.xml><?xml version="1.0" encoding="utf-8"?>
+<p:notes xmlns:a="http://schemas.openxmlformats.org/drawingml/2006/main" xmlns:r="http://schemas.openxmlformats.org/officeDocument/2006/relationships" xmlns:p="http://schemas.openxmlformats.org/presentationml/2006/main">
+  <p:cSld>
+    <p:spTree>
+      <p:nvGrpSpPr>
+        <p:cNvPr id="1" name=""/>
+        <p:cNvGrpSpPr/>
+        <p:nvPr/>
+      </p:nvGrpSpPr>
+      <p:grpSpPr>
+        <a:xfrm>
+          <a:off x="0" y="0"/>
+          <a:ext cx="0" cy="0"/>
+          <a:chOff x="0" y="0"/>
+          <a:chExt cx="0" cy="0"/>
+        </a:xfrm>
+      </p:grpSpPr>
+      <p:sp>
+        <p:nvSpPr>
+          <p:cNvPr id="2" name="Slide Image Placeholder 1"/>
+          <p:cNvSpPr>
+            <a:spLocks noGrp="1" noRot="1" noChangeAspect="1"/>
+          </p:cNvSpPr>
+          <p:nvPr>
+            <p:ph type="sldImg"/>
+          </p:nvPr>
+        </p:nvSpPr>
+        <p:spPr/>
+      </p:sp>
+      <p:sp>
+        <p:nvSpPr>
+          <p:cNvPr id="3" name="Notes Placeholder 2"/>
+          <p:cNvSpPr>
+            <a:spLocks noGrp="1"/>
+          </p:cNvSpPr>
+          <p:nvPr>
+            <p:ph type="body" idx="1"/>
+          </p:nvPr>
+        </p:nvSpPr>
+        <p:spPr/>
+        <p:txBody>
+          <a:bodyPr/>
+          <a:lstStyle/>
+          <a:p>
+            <a:r>
+              <a:rPr lang="en-US" dirty="0"/>
+              <a:t>Not good.</a:t>
+            </a:r>
+          </a:p>
+        </p:txBody>
+      </p:sp>
+      <p:sp>
+        <p:nvSpPr>
+          <p:cNvPr id="4" name="Slide Number Placeholder 3"/>
+          <p:cNvSpPr>
+            <a:spLocks noGrp="1"/>
+          </p:cNvSpPr>
+          <p:nvPr>
+            <p:ph type="sldNum" sz="quarter" idx="5"/>
+          </p:nvPr>
+        </p:nvSpPr>
+        <p:spPr/>
+        <p:txBody>
+          <a:bodyPr/>
+          <a:lstStyle/>
+          <a:p>
+            <a:fld id="{7F319059-25A4-0F41-A286-2263025C0642}" type="slidenum">
+              <a:rPr lang="en-US" smtClean="0"/>
+              <a:t>8</a:t>
+            </a:fld>
+            <a:endParaRPr lang="en-US"/>
+          </a:p>
+        </p:txBody>
+      </p:sp>
+    </p:spTree>
+    <p:extLst>
+      <p:ext uri="{BB962C8B-B14F-4D97-AF65-F5344CB8AC3E}">
+        <p14:creationId xmlns:p14="http://schemas.microsoft.com/office/powerpoint/2010/main" val="2412296167"/>
+      </p:ext>
+    </p:extLst>
+  </p:cSld>
+  <p:clrMapOvr>
+    <a:masterClrMapping/>
+  </p:clrMapOvr>
+</p:notes>
+</file>
+
+<file path=ppt/notesSlides/notesSlide7.xml><?xml version="1.0" encoding="utf-8"?>
+<p:notes xmlns:a="http://schemas.openxmlformats.org/drawingml/2006/main" xmlns:r="http://schemas.openxmlformats.org/officeDocument/2006/relationships" xmlns:p="http://schemas.openxmlformats.org/presentationml/2006/main">
+  <p:cSld>
+    <p:spTree>
+      <p:nvGrpSpPr>
+        <p:cNvPr id="1" name=""/>
+        <p:cNvGrpSpPr/>
+        <p:nvPr/>
+      </p:nvGrpSpPr>
+      <p:grpSpPr>
+        <a:xfrm>
+          <a:off x="0" y="0"/>
+          <a:ext cx="0" cy="0"/>
+          <a:chOff x="0" y="0"/>
+          <a:chExt cx="0" cy="0"/>
+        </a:xfrm>
+      </p:grpSpPr>
+      <p:sp>
+        <p:nvSpPr>
+          <p:cNvPr id="2" name="Slide Image Placeholder 1"/>
+          <p:cNvSpPr>
+            <a:spLocks noGrp="1" noRot="1" noChangeAspect="1"/>
+          </p:cNvSpPr>
+          <p:nvPr>
+            <p:ph type="sldImg"/>
+          </p:nvPr>
+        </p:nvSpPr>
+        <p:spPr/>
+      </p:sp>
+      <p:sp>
+        <p:nvSpPr>
+          <p:cNvPr id="3" name="Notes Placeholder 2"/>
+          <p:cNvSpPr>
+            <a:spLocks noGrp="1"/>
+          </p:cNvSpPr>
+          <p:nvPr>
+            <p:ph type="body" idx="1"/>
+          </p:nvPr>
+        </p:nvSpPr>
+        <p:spPr/>
+        <p:txBody>
+          <a:bodyPr/>
+          <a:lstStyle/>
+          <a:p>
+            <a:r>
+              <a:rPr lang="en-US" dirty="0"/>
+              <a:t>This methodology was unsuccessful at predicting stock returns</a:t>
+            </a:r>
+          </a:p>
+          <a:p>
+            <a:endParaRPr lang="en-US" dirty="0"/>
+          </a:p>
+          <a:p>
+            <a:r>
+              <a:rPr lang="en-US" dirty="0"/>
+              <a:t>All three models proved to be under fitted to the data</a:t>
+            </a:r>
+          </a:p>
+          <a:p>
+            <a:endParaRPr lang="en-US" dirty="0"/>
+          </a:p>
+          <a:p>
+            <a:r>
+              <a:rPr lang="en-US" dirty="0"/>
+              <a:t>Cross validation scores showed that none of the models performed well, but that Random Forest performed the best of the 3</a:t>
+            </a:r>
+          </a:p>
+          <a:p>
+            <a:endParaRPr lang="en-US" dirty="0"/>
+          </a:p>
+          <a:p>
+            <a:r>
+              <a:rPr lang="en-US" dirty="0"/>
+              <a:t>It is clear that feature engineering and variable selection are important, as these were largely the only reasons that I was able to get anything north of 0 for R2</a:t>
+            </a:r>
+          </a:p>
+        </p:txBody>
+      </p:sp>
+      <p:sp>
+        <p:nvSpPr>
+          <p:cNvPr id="4" name="Slide Number Placeholder 3"/>
+          <p:cNvSpPr>
+            <a:spLocks noGrp="1"/>
+          </p:cNvSpPr>
+          <p:nvPr>
+            <p:ph type="sldNum" sz="quarter" idx="5"/>
+          </p:nvPr>
+        </p:nvSpPr>
+        <p:spPr/>
+        <p:txBody>
+          <a:bodyPr/>
+          <a:lstStyle/>
+          <a:p>
+            <a:fld id="{7F319059-25A4-0F41-A286-2263025C0642}" type="slidenum">
+              <a:rPr lang="en-US" smtClean="0"/>
+              <a:t>9</a:t>
+            </a:fld>
+            <a:endParaRPr lang="en-US"/>
+          </a:p>
+        </p:txBody>
+      </p:sp>
+    </p:spTree>
+    <p:extLst>
+      <p:ext uri="{BB962C8B-B14F-4D97-AF65-F5344CB8AC3E}">
+        <p14:creationId xmlns:p14="http://schemas.microsoft.com/office/powerpoint/2010/main" val="191450253"/>
+      </p:ext>
+    </p:extLst>
+  </p:cSld>
+  <p:clrMapOvr>
+    <a:masterClrMapping/>
+  </p:clrMapOvr>
+</p:notes>
+</file>
+
+<file path=ppt/notesSlides/notesSlide8.xml><?xml version="1.0" encoding="utf-8"?>
 <p:notes xmlns:a="http://schemas.openxmlformats.org/drawingml/2006/main" xmlns:r="http://schemas.openxmlformats.org/officeDocument/2006/relationships" xmlns:p="http://schemas.openxmlformats.org/presentationml/2006/main">
   <p:cSld>
     <p:spTree>
@@ -1179,7 +2448,7 @@
           <a:p>
             <a:fld id="{E7E07854-55B0-FC4D-8D40-0D378FEC596F}" type="datetimeFigureOut">
               <a:rPr lang="en-US" smtClean="0"/>
-              <a:t>6/11/23</a:t>
+              <a:t>6/12/23</a:t>
             </a:fld>
             <a:endParaRPr lang="en-US"/>
           </a:p>
@@ -1517,7 +2786,7 @@
           <a:p>
             <a:fld id="{E7E07854-55B0-FC4D-8D40-0D378FEC596F}" type="datetimeFigureOut">
               <a:rPr lang="en-US" smtClean="0"/>
-              <a:t>6/11/23</a:t>
+              <a:t>6/12/23</a:t>
             </a:fld>
             <a:endParaRPr lang="en-US"/>
           </a:p>
@@ -1918,7 +3187,7 @@
           <a:p>
             <a:fld id="{E7E07854-55B0-FC4D-8D40-0D378FEC596F}" type="datetimeFigureOut">
               <a:rPr lang="en-US" smtClean="0"/>
-              <a:t>6/11/23</a:t>
+              <a:t>6/12/23</a:t>
             </a:fld>
             <a:endParaRPr lang="en-US"/>
           </a:p>
@@ -2254,7 +3523,7 @@
           <a:p>
             <a:fld id="{E7E07854-55B0-FC4D-8D40-0D378FEC596F}" type="datetimeFigureOut">
               <a:rPr lang="en-US" smtClean="0"/>
-              <a:t>6/11/23</a:t>
+              <a:t>6/12/23</a:t>
             </a:fld>
             <a:endParaRPr lang="en-US"/>
           </a:p>
@@ -2574,7 +3843,7 @@
           <a:p>
             <a:fld id="{E7E07854-55B0-FC4D-8D40-0D378FEC596F}" type="datetimeFigureOut">
               <a:rPr lang="en-US" smtClean="0"/>
-              <a:t>6/11/23</a:t>
+              <a:t>6/12/23</a:t>
             </a:fld>
             <a:endParaRPr lang="en-US"/>
           </a:p>
@@ -2970,7 +4239,7 @@
           <a:p>
             <a:fld id="{E7E07854-55B0-FC4D-8D40-0D378FEC596F}" type="datetimeFigureOut">
               <a:rPr lang="en-US" smtClean="0"/>
-              <a:t>6/11/23</a:t>
+              <a:t>6/12/23</a:t>
             </a:fld>
             <a:endParaRPr lang="en-US"/>
           </a:p>
@@ -3227,7 +4496,7 @@
           <a:p>
             <a:fld id="{E7E07854-55B0-FC4D-8D40-0D378FEC596F}" type="datetimeFigureOut">
               <a:rPr lang="en-US" smtClean="0"/>
-              <a:t>6/11/23</a:t>
+              <a:t>6/12/23</a:t>
             </a:fld>
             <a:endParaRPr lang="en-US"/>
           </a:p>
@@ -3489,7 +4758,7 @@
           <a:p>
             <a:fld id="{E7E07854-55B0-FC4D-8D40-0D378FEC596F}" type="datetimeFigureOut">
               <a:rPr lang="en-US" smtClean="0"/>
-              <a:t>6/11/23</a:t>
+              <a:t>6/12/23</a:t>
             </a:fld>
             <a:endParaRPr lang="en-US"/>
           </a:p>
@@ -3751,7 +5020,7 @@
           <a:p>
             <a:fld id="{E7E07854-55B0-FC4D-8D40-0D378FEC596F}" type="datetimeFigureOut">
               <a:rPr lang="en-US" smtClean="0"/>
-              <a:t>6/11/23</a:t>
+              <a:t>6/12/23</a:t>
             </a:fld>
             <a:endParaRPr lang="en-US"/>
           </a:p>
@@ -4080,7 +5349,7 @@
           <a:p>
             <a:fld id="{E7E07854-55B0-FC4D-8D40-0D378FEC596F}" type="datetimeFigureOut">
               <a:rPr lang="en-US" smtClean="0"/>
-              <a:t>6/11/23</a:t>
+              <a:t>6/12/23</a:t>
             </a:fld>
             <a:endParaRPr lang="en-US"/>
           </a:p>
@@ -4403,7 +5672,7 @@
           <a:p>
             <a:fld id="{E7E07854-55B0-FC4D-8D40-0D378FEC596F}" type="datetimeFigureOut">
               <a:rPr lang="en-US" smtClean="0"/>
-              <a:t>6/11/23</a:t>
+              <a:t>6/12/23</a:t>
             </a:fld>
             <a:endParaRPr lang="en-US"/>
           </a:p>
@@ -4860,7 +6129,7 @@
           <a:p>
             <a:fld id="{E7E07854-55B0-FC4D-8D40-0D378FEC596F}" type="datetimeFigureOut">
               <a:rPr lang="en-US" smtClean="0"/>
-              <a:t>6/11/23</a:t>
+              <a:t>6/12/23</a:t>
             </a:fld>
             <a:endParaRPr lang="en-US"/>
           </a:p>
@@ -5065,7 +6334,7 @@
           <a:p>
             <a:fld id="{E7E07854-55B0-FC4D-8D40-0D378FEC596F}" type="datetimeFigureOut">
               <a:rPr lang="en-US" smtClean="0"/>
-              <a:t>6/11/23</a:t>
+              <a:t>6/12/23</a:t>
             </a:fld>
             <a:endParaRPr lang="en-US"/>
           </a:p>
@@ -5242,7 +6511,7 @@
           <a:p>
             <a:fld id="{E7E07854-55B0-FC4D-8D40-0D378FEC596F}" type="datetimeFigureOut">
               <a:rPr lang="en-US" smtClean="0"/>
-              <a:t>6/11/23</a:t>
+              <a:t>6/12/23</a:t>
             </a:fld>
             <a:endParaRPr lang="en-US"/>
           </a:p>
@@ -5575,7 +6844,7 @@
           <a:p>
             <a:fld id="{E7E07854-55B0-FC4D-8D40-0D378FEC596F}" type="datetimeFigureOut">
               <a:rPr lang="en-US" smtClean="0"/>
-              <a:t>6/11/23</a:t>
+              <a:t>6/12/23</a:t>
             </a:fld>
             <a:endParaRPr lang="en-US"/>
           </a:p>
@@ -5920,7 +7189,7 @@
           <a:p>
             <a:fld id="{E7E07854-55B0-FC4D-8D40-0D378FEC596F}" type="datetimeFigureOut">
               <a:rPr lang="en-US" smtClean="0"/>
-              <a:t>6/11/23</a:t>
+              <a:t>6/12/23</a:t>
             </a:fld>
             <a:endParaRPr lang="en-US"/>
           </a:p>
@@ -8037,7 +9306,7 @@
           <a:p>
             <a:fld id="{E7E07854-55B0-FC4D-8D40-0D378FEC596F}" type="datetimeFigureOut">
               <a:rPr lang="en-US" smtClean="0"/>
-              <a:t>6/11/23</a:t>
+              <a:t>6/12/23</a:t>
             </a:fld>
             <a:endParaRPr lang="en-US"/>
           </a:p>
@@ -8921,7 +10190,7 @@
         </p:nvSpPr>
         <p:spPr>
           <a:xfrm>
-            <a:off x="838200" y="1825625"/>
+            <a:off x="1286227" y="1871979"/>
             <a:ext cx="3686291" cy="4351338"/>
           </a:xfrm>
         </p:spPr>
@@ -8946,12 +10215,6 @@
             <a:r>
               <a:rPr lang="en-US" dirty="0"/>
               <a:t>Stocks with a high potential to go up based on earnings increases</a:t>
-            </a:r>
-          </a:p>
-          <a:p>
-            <a:r>
-              <a:rPr lang="en-US" dirty="0"/>
-              <a:t>Personal Interests</a:t>
             </a:r>
           </a:p>
         </p:txBody>
@@ -8971,7 +10234,7 @@
           <p:nvPr/>
         </p:nvPicPr>
         <p:blipFill>
-          <a:blip r:embed="rId2"/>
+          <a:blip r:embed="rId3"/>
           <a:stretch>
             <a:fillRect/>
           </a:stretch>
@@ -9114,7 +10377,7 @@
         <p:spPr/>
         <p:txBody>
           <a:bodyPr>
-            <a:normAutofit fontScale="92500" lnSpcReduction="10000"/>
+            <a:normAutofit fontScale="77500" lnSpcReduction="20000"/>
           </a:bodyPr>
           <a:lstStyle/>
           <a:p>
@@ -9157,6 +10420,28 @@
               <a:rPr lang="en-US" dirty="0"/>
               <a:t>Pessimism Factor – Trading on social media sentiment alone </a:t>
             </a:r>
+          </a:p>
+          <a:p>
+            <a:pPr lvl="1"/>
+            <a:endParaRPr lang="en-US" dirty="0"/>
+          </a:p>
+          <a:p>
+            <a:r>
+              <a:rPr lang="en-US" dirty="0"/>
+              <a:t>Other papers and readings on the relevance of financial statements in making stock buy/sell  decisions are also available, with no data mining relevance:</a:t>
+            </a:r>
+          </a:p>
+          <a:p>
+            <a:pPr lvl="1"/>
+            <a:r>
+              <a:rPr lang="en-US" dirty="0">
+                <a:effectLst/>
+                <a:latin typeface="Times New Roman" panose="02020603050405020304" pitchFamily="18" charset="0"/>
+                <a:ea typeface="MS Mincho" panose="02020609040205080304" pitchFamily="49" charset="-128"/>
+              </a:rPr>
+              <a:t>"Financial Statement Analysis and the Prediction of Stock Returns," Journal of Accounting and Economics</a:t>
+            </a:r>
+            <a:endParaRPr lang="en-US" dirty="0"/>
           </a:p>
         </p:txBody>
       </p:sp>
@@ -9195,148 +10480,6 @@
           <p:cNvPr id="2" name="Title 1">
             <a:extLst>
               <a:ext uri="{FF2B5EF4-FFF2-40B4-BE49-F238E27FC236}">
-                <a16:creationId xmlns:a16="http://schemas.microsoft.com/office/drawing/2014/main" id="{50E1B5B0-D7BC-EB8D-7BCD-C53D6BDA2663}"/>
-              </a:ext>
-            </a:extLst>
-          </p:cNvPr>
-          <p:cNvSpPr>
-            <a:spLocks noGrp="1"/>
-          </p:cNvSpPr>
-          <p:nvPr>
-            <p:ph type="title"/>
-          </p:nvPr>
-        </p:nvSpPr>
-        <p:spPr/>
-        <p:txBody>
-          <a:bodyPr/>
-          <a:lstStyle/>
-          <a:p>
-            <a:r>
-              <a:rPr lang="en-US" dirty="0"/>
-              <a:t>Experiment Design</a:t>
-            </a:r>
-          </a:p>
-        </p:txBody>
-      </p:sp>
-      <p:sp>
-        <p:nvSpPr>
-          <p:cNvPr id="3" name="Content Placeholder 2">
-            <a:extLst>
-              <a:ext uri="{FF2B5EF4-FFF2-40B4-BE49-F238E27FC236}">
-                <a16:creationId xmlns:a16="http://schemas.microsoft.com/office/drawing/2014/main" id="{1B12EEAD-9BF1-43AA-382D-8A139B696145}"/>
-              </a:ext>
-            </a:extLst>
-          </p:cNvPr>
-          <p:cNvSpPr>
-            <a:spLocks noGrp="1"/>
-          </p:cNvSpPr>
-          <p:nvPr>
-            <p:ph idx="1"/>
-          </p:nvPr>
-        </p:nvSpPr>
-        <p:spPr>
-          <a:xfrm>
-            <a:off x="838200" y="1495119"/>
-            <a:ext cx="5154976" cy="4351338"/>
-          </a:xfrm>
-        </p:spPr>
-        <p:txBody>
-          <a:bodyPr/>
-          <a:lstStyle/>
-          <a:p>
-            <a:r>
-              <a:rPr lang="en-US" dirty="0"/>
-              <a:t>Data Collection Not Reflected In Diagram</a:t>
-            </a:r>
-          </a:p>
-          <a:p>
-            <a:r>
-              <a:rPr lang="en-US" dirty="0"/>
-              <a:t>Data is split, Models are fit and trained</a:t>
-            </a:r>
-          </a:p>
-          <a:p>
-            <a:r>
-              <a:rPr lang="en-US" dirty="0"/>
-              <a:t>Prediction, Evaluation, Cross Validation</a:t>
-            </a:r>
-          </a:p>
-          <a:p>
-            <a:r>
-              <a:rPr lang="en-US" dirty="0"/>
-              <a:t>Output to Results Files</a:t>
-            </a:r>
-          </a:p>
-          <a:p>
-            <a:endParaRPr lang="en-US" dirty="0"/>
-          </a:p>
-        </p:txBody>
-      </p:sp>
-      <p:pic>
-        <p:nvPicPr>
-          <p:cNvPr id="6" name="Picture 5">
-            <a:extLst>
-              <a:ext uri="{FF2B5EF4-FFF2-40B4-BE49-F238E27FC236}">
-                <a16:creationId xmlns:a16="http://schemas.microsoft.com/office/drawing/2014/main" id="{31F7A712-F300-058B-C5A5-676AE07846EB}"/>
-              </a:ext>
-            </a:extLst>
-          </p:cNvPr>
-          <p:cNvPicPr>
-            <a:picLocks noChangeAspect="1"/>
-          </p:cNvPicPr>
-          <p:nvPr/>
-        </p:nvPicPr>
-        <p:blipFill>
-          <a:blip r:embed="rId2"/>
-          <a:stretch>
-            <a:fillRect/>
-          </a:stretch>
-        </p:blipFill>
-        <p:spPr>
-          <a:xfrm>
-            <a:off x="7973479" y="0"/>
-            <a:ext cx="2877401" cy="6966128"/>
-          </a:xfrm>
-          <a:prstGeom prst="rect">
-            <a:avLst/>
-          </a:prstGeom>
-        </p:spPr>
-      </p:pic>
-    </p:spTree>
-    <p:extLst>
-      <p:ext uri="{BB962C8B-B14F-4D97-AF65-F5344CB8AC3E}">
-        <p14:creationId xmlns:p14="http://schemas.microsoft.com/office/powerpoint/2010/main" val="3603243855"/>
-      </p:ext>
-    </p:extLst>
-  </p:cSld>
-  <p:clrMapOvr>
-    <a:masterClrMapping/>
-  </p:clrMapOvr>
-</p:sld>
-</file>
-
-<file path=ppt/slides/slide6.xml><?xml version="1.0" encoding="utf-8"?>
-<p:sld xmlns:a="http://schemas.openxmlformats.org/drawingml/2006/main" xmlns:r="http://schemas.openxmlformats.org/officeDocument/2006/relationships" xmlns:p="http://schemas.openxmlformats.org/presentationml/2006/main">
-  <p:cSld>
-    <p:spTree>
-      <p:nvGrpSpPr>
-        <p:cNvPr id="1" name=""/>
-        <p:cNvGrpSpPr/>
-        <p:nvPr/>
-      </p:nvGrpSpPr>
-      <p:grpSpPr>
-        <a:xfrm>
-          <a:off x="0" y="0"/>
-          <a:ext cx="0" cy="0"/>
-          <a:chOff x="0" y="0"/>
-          <a:chExt cx="0" cy="0"/>
-        </a:xfrm>
-      </p:grpSpPr>
-      <p:sp>
-        <p:nvSpPr>
-          <p:cNvPr id="2" name="Title 1">
-            <a:extLst>
-              <a:ext uri="{FF2B5EF4-FFF2-40B4-BE49-F238E27FC236}">
                 <a16:creationId xmlns:a16="http://schemas.microsoft.com/office/drawing/2014/main" id="{73F7577D-5809-FBA5-B80E-A9C91F7775FF}"/>
               </a:ext>
             </a:extLst>
@@ -9420,7 +10563,7 @@
           <p:nvPr/>
         </p:nvPicPr>
         <p:blipFill>
-          <a:blip r:embed="rId2"/>
+          <a:blip r:embed="rId3"/>
           <a:stretch>
             <a:fillRect/>
           </a:stretch>
@@ -9450,7 +10593,7 @@
           <p:nvPr/>
         </p:nvPicPr>
         <p:blipFill>
-          <a:blip r:embed="rId3"/>
+          <a:blip r:embed="rId4"/>
           <a:stretch>
             <a:fillRect/>
           </a:stretch>
@@ -9480,14 +10623,14 @@
           <p:nvPr/>
         </p:nvPicPr>
         <p:blipFill>
-          <a:blip r:embed="rId4"/>
+          <a:blip r:embed="rId5"/>
           <a:stretch>
             <a:fillRect/>
           </a:stretch>
         </p:blipFill>
         <p:spPr>
           <a:xfrm>
-            <a:off x="4781319" y="228630"/>
+            <a:off x="4848190" y="1405666"/>
             <a:ext cx="3498603" cy="1952709"/>
           </a:xfrm>
           <a:prstGeom prst="rect">
@@ -9510,7 +10653,7 @@
           <p:nvPr/>
         </p:nvPicPr>
         <p:blipFill>
-          <a:blip r:embed="rId5"/>
+          <a:blip r:embed="rId6"/>
           <a:stretch>
             <a:fillRect/>
           </a:stretch>
@@ -9535,15 +10678,15 @@
             </a:extLst>
           </p:cNvPr>
           <p:cNvCxnSpPr>
-            <a:stCxn id="9" idx="3"/>
+            <a:cxnSpLocks/>
             <a:endCxn id="11" idx="1"/>
           </p:cNvCxnSpPr>
           <p:nvPr/>
         </p:nvCxnSpPr>
         <p:spPr>
           <a:xfrm flipV="1">
-            <a:off x="8279922" y="1204984"/>
-            <a:ext cx="425482" cy="1"/>
+            <a:off x="8346793" y="1204984"/>
+            <a:ext cx="358611" cy="200682"/>
           </a:xfrm>
           <a:prstGeom prst="straightConnector1">
             <a:avLst/>
@@ -9689,7 +10832,7 @@
           <p:nvPr/>
         </p:nvPicPr>
         <p:blipFill>
-          <a:blip r:embed="rId6"/>
+          <a:blip r:embed="rId7"/>
           <a:stretch>
             <a:fillRect/>
           </a:stretch>
@@ -9720,9 +10863,9 @@
           <p:nvPr/>
         </p:nvCxnSpPr>
         <p:spPr>
-          <a:xfrm>
-            <a:off x="10437143" y="2113091"/>
-            <a:ext cx="0" cy="537861"/>
+          <a:xfrm flipH="1">
+            <a:off x="9977377" y="2113091"/>
+            <a:ext cx="459766" cy="595385"/>
           </a:xfrm>
           <a:prstGeom prst="straightConnector1">
             <a:avLst/>
@@ -9762,6 +10905,161 @@
 </p:sld>
 </file>
 
+<file path=ppt/slides/slide6.xml><?xml version="1.0" encoding="utf-8"?>
+<p:sld xmlns:a="http://schemas.openxmlformats.org/drawingml/2006/main" xmlns:r="http://schemas.openxmlformats.org/officeDocument/2006/relationships" xmlns:p="http://schemas.openxmlformats.org/presentationml/2006/main">
+  <p:cSld>
+    <p:spTree>
+      <p:nvGrpSpPr>
+        <p:cNvPr id="1" name=""/>
+        <p:cNvGrpSpPr/>
+        <p:nvPr/>
+      </p:nvGrpSpPr>
+      <p:grpSpPr>
+        <a:xfrm>
+          <a:off x="0" y="0"/>
+          <a:ext cx="0" cy="0"/>
+          <a:chOff x="0" y="0"/>
+          <a:chExt cx="0" cy="0"/>
+        </a:xfrm>
+      </p:grpSpPr>
+      <p:sp>
+        <p:nvSpPr>
+          <p:cNvPr id="2" name="Title 1">
+            <a:extLst>
+              <a:ext uri="{FF2B5EF4-FFF2-40B4-BE49-F238E27FC236}">
+                <a16:creationId xmlns:a16="http://schemas.microsoft.com/office/drawing/2014/main" id="{50E1B5B0-D7BC-EB8D-7BCD-C53D6BDA2663}"/>
+              </a:ext>
+            </a:extLst>
+          </p:cNvPr>
+          <p:cNvSpPr>
+            <a:spLocks noGrp="1"/>
+          </p:cNvSpPr>
+          <p:nvPr>
+            <p:ph type="title"/>
+          </p:nvPr>
+        </p:nvSpPr>
+        <p:spPr/>
+        <p:txBody>
+          <a:bodyPr/>
+          <a:lstStyle/>
+          <a:p>
+            <a:r>
+              <a:rPr lang="en-US" dirty="0"/>
+              <a:t>Experiment Design</a:t>
+            </a:r>
+          </a:p>
+        </p:txBody>
+      </p:sp>
+      <p:sp>
+        <p:nvSpPr>
+          <p:cNvPr id="3" name="Content Placeholder 2">
+            <a:extLst>
+              <a:ext uri="{FF2B5EF4-FFF2-40B4-BE49-F238E27FC236}">
+                <a16:creationId xmlns:a16="http://schemas.microsoft.com/office/drawing/2014/main" id="{1B12EEAD-9BF1-43AA-382D-8A139B696145}"/>
+              </a:ext>
+            </a:extLst>
+          </p:cNvPr>
+          <p:cNvSpPr>
+            <a:spLocks noGrp="1"/>
+          </p:cNvSpPr>
+          <p:nvPr>
+            <p:ph idx="1"/>
+          </p:nvPr>
+        </p:nvSpPr>
+        <p:spPr>
+          <a:xfrm>
+            <a:off x="838200" y="1495119"/>
+            <a:ext cx="5154976" cy="4351338"/>
+          </a:xfrm>
+        </p:spPr>
+        <p:txBody>
+          <a:bodyPr/>
+          <a:lstStyle/>
+          <a:p>
+            <a:r>
+              <a:rPr lang="en-US" dirty="0"/>
+              <a:t>Data Collection Not Reflected In Diagram</a:t>
+            </a:r>
+          </a:p>
+          <a:p>
+            <a:r>
+              <a:rPr lang="en-US" dirty="0"/>
+              <a:t>Data is split, Models are fit and trained</a:t>
+            </a:r>
+          </a:p>
+          <a:p>
+            <a:r>
+              <a:rPr lang="en-US" dirty="0"/>
+              <a:t>Prediction, Evaluation, Cross Validation</a:t>
+            </a:r>
+          </a:p>
+          <a:p>
+            <a:r>
+              <a:rPr lang="en-US" dirty="0"/>
+              <a:t>Output to Results Files</a:t>
+            </a:r>
+          </a:p>
+          <a:p>
+            <a:r>
+              <a:rPr lang="en-US" dirty="0"/>
+              <a:t>Compare results from </a:t>
+            </a:r>
+            <a:r>
+              <a:rPr lang="en-US" dirty="0">
+                <a:sym typeface="Wingdings" pitchFamily="2" charset="2"/>
+              </a:rPr>
+              <a:t>Linear Regression, Random Forest, and Support Vector Machine</a:t>
+            </a:r>
+            <a:endParaRPr lang="en-US" dirty="0"/>
+          </a:p>
+          <a:p>
+            <a:endParaRPr lang="en-US" dirty="0"/>
+          </a:p>
+        </p:txBody>
+      </p:sp>
+      <p:pic>
+        <p:nvPicPr>
+          <p:cNvPr id="6" name="Picture 5">
+            <a:extLst>
+              <a:ext uri="{FF2B5EF4-FFF2-40B4-BE49-F238E27FC236}">
+                <a16:creationId xmlns:a16="http://schemas.microsoft.com/office/drawing/2014/main" id="{31F7A712-F300-058B-C5A5-676AE07846EB}"/>
+              </a:ext>
+            </a:extLst>
+          </p:cNvPr>
+          <p:cNvPicPr>
+            <a:picLocks noChangeAspect="1"/>
+          </p:cNvPicPr>
+          <p:nvPr/>
+        </p:nvPicPr>
+        <p:blipFill>
+          <a:blip r:embed="rId3"/>
+          <a:stretch>
+            <a:fillRect/>
+          </a:stretch>
+        </p:blipFill>
+        <p:spPr>
+          <a:xfrm>
+            <a:off x="7973479" y="0"/>
+            <a:ext cx="2877401" cy="6966128"/>
+          </a:xfrm>
+          <a:prstGeom prst="rect">
+            <a:avLst/>
+          </a:prstGeom>
+        </p:spPr>
+      </p:pic>
+    </p:spTree>
+    <p:extLst>
+      <p:ext uri="{BB962C8B-B14F-4D97-AF65-F5344CB8AC3E}">
+        <p14:creationId xmlns:p14="http://schemas.microsoft.com/office/powerpoint/2010/main" val="3603243855"/>
+      </p:ext>
+    </p:extLst>
+  </p:cSld>
+  <p:clrMapOvr>
+    <a:masterClrMapping/>
+  </p:clrMapOvr>
+</p:sld>
+</file>
+
 <file path=ppt/slides/slide7.xml><?xml version="1.0" encoding="utf-8"?>
 <p:sld xmlns:a="http://schemas.openxmlformats.org/drawingml/2006/main" xmlns:r="http://schemas.openxmlformats.org/officeDocument/2006/relationships" xmlns:p="http://schemas.openxmlformats.org/presentationml/2006/main">
   <p:cSld>
@@ -9865,7 +11163,7 @@
         </p:blipFill>
         <p:spPr>
           <a:xfrm>
-            <a:off x="6528584" y="365125"/>
+            <a:off x="7606757" y="613959"/>
             <a:ext cx="3695490" cy="3640568"/>
           </a:xfrm>
           <a:prstGeom prst="rect">
@@ -9895,7 +11193,7 @@
         </p:blipFill>
         <p:spPr>
           <a:xfrm>
-            <a:off x="6528584" y="4423757"/>
+            <a:off x="7473141" y="4369166"/>
             <a:ext cx="3962721" cy="2191978"/>
           </a:xfrm>
           <a:prstGeom prst="rect">
@@ -10021,14 +11319,14 @@
           <p:nvPr>
             <p:extLst>
               <p:ext uri="{D42A27DB-BD31-4B8C-83A1-F6EECF244321}">
-                <p14:modId xmlns:p14="http://schemas.microsoft.com/office/powerpoint/2010/main" val="3130964518"/>
+                <p14:modId xmlns:p14="http://schemas.microsoft.com/office/powerpoint/2010/main" val="2693828049"/>
               </p:ext>
             </p:extLst>
           </p:nvPr>
         </p:nvGraphicFramePr>
         <p:xfrm>
-          <a:off x="6096000" y="365125"/>
-          <a:ext cx="5571281" cy="1717855"/>
+          <a:off x="6096000" y="1336401"/>
+          <a:ext cx="5571281" cy="1718320"/>
         </p:xfrm>
         <a:graphic>
           <a:graphicData uri="http://schemas.openxmlformats.org/drawingml/2006/table">
@@ -10662,13 +11960,13 @@
           <p:nvPr>
             <p:extLst>
               <p:ext uri="{D42A27DB-BD31-4B8C-83A1-F6EECF244321}">
-                <p14:modId xmlns:p14="http://schemas.microsoft.com/office/powerpoint/2010/main" val="3999377154"/>
+                <p14:modId xmlns:p14="http://schemas.microsoft.com/office/powerpoint/2010/main" val="2128146352"/>
               </p:ext>
             </p:extLst>
           </p:nvPr>
         </p:nvGraphicFramePr>
         <p:xfrm>
-          <a:off x="6096000" y="2213006"/>
+          <a:off x="6096001" y="3566789"/>
           <a:ext cx="5571280" cy="1788288"/>
         </p:xfrm>
         <a:graphic>

</xml_diff>